<commit_message>
updated slides and refs
</commit_message>
<xml_diff>
--- a/eacl2017/slides/applications.pptx
+++ b/eacl2017/slides/applications.pptx
@@ -306,7 +306,7 @@
           <a:p>
             <a:fld id="{1A373124-5F25-224D-9BF8-4FF24661EFD3}" type="datetimeFigureOut">
               <a:rPr lang="en-US" smtClean="0"/>
-              <a:t>4/3/17</a:t>
+              <a:t>4/4/17</a:t>
             </a:fld>
             <a:endParaRPr lang="en-US"/>
           </a:p>
@@ -22459,11 +22459,7 @@
           <a:p>
             <a:r>
               <a:rPr lang="en-US" dirty="0" smtClean="0"/>
-              <a:t>Makes it easy </a:t>
-            </a:r>
-            <a:r>
-              <a:rPr lang="en-US" dirty="0" smtClean="0"/>
-              <a:t>to add </a:t>
+              <a:t>Makes it easy to add </a:t>
             </a:r>
             <a:r>
               <a:rPr lang="en-US" i="1" dirty="0" smtClean="0"/>
@@ -23721,27 +23717,7 @@
           <a:p>
             <a:r>
               <a:rPr lang="en-US" dirty="0" smtClean="0"/>
-              <a:t>[</a:t>
-            </a:r>
-            <a:r>
-              <a:rPr lang="en-US" dirty="0" smtClean="0"/>
-              <a:t>K-W </a:t>
-            </a:r>
-            <a:r>
-              <a:rPr lang="en-US" dirty="0" smtClean="0"/>
-              <a:t>Chang et al 2011, Denis &amp; </a:t>
-            </a:r>
-            <a:r>
-              <a:rPr lang="en-US" dirty="0" smtClean="0"/>
-              <a:t>Baldridge</a:t>
-            </a:r>
-            <a:r>
-              <a:rPr lang="en-US" dirty="0" smtClean="0"/>
-              <a:t>, </a:t>
-            </a:r>
-            <a:r>
-              <a:rPr lang="en-US" dirty="0" smtClean="0"/>
-              <a:t>2007]</a:t>
+              <a:t>[K-W Chang et al 2011, Denis &amp; Baldridge, 2007]</a:t>
             </a:r>
             <a:endParaRPr lang="en-US" dirty="0"/>
           </a:p>
@@ -25104,15 +25080,7 @@
                   <a:schemeClr val="tx1"/>
                 </a:solidFill>
               </a:rPr>
-              <a:t>For each </a:t>
-            </a:r>
-            <a:r>
-              <a:rPr lang="en-US" altLang="zh-TW" dirty="0" smtClean="0">
-                <a:solidFill>
-                  <a:schemeClr val="tx1"/>
-                </a:solidFill>
-              </a:rPr>
-              <a:t>mention, </a:t>
+              <a:t>For each mention, </a:t>
             </a:r>
             <a:r>
               <a:rPr lang="en-US" altLang="zh-TW" dirty="0"/>
@@ -25124,15 +25092,7 @@
                   <a:schemeClr val="tx1"/>
                 </a:solidFill>
               </a:rPr>
-              <a:t>est-Link considers the </a:t>
-            </a:r>
-            <a:r>
-              <a:rPr lang="en-US" altLang="zh-TW" dirty="0" smtClean="0">
-                <a:solidFill>
-                  <a:schemeClr val="tx1"/>
-                </a:solidFill>
-              </a:rPr>
-              <a:t>best mention on its left to connect to</a:t>
+              <a:t>est-Link considers the best mention on its left to connect to</a:t>
             </a:r>
           </a:p>
           <a:p>
@@ -25231,10 +25191,28 @@
                   <a:schemeClr val="tx1"/>
                 </a:solidFill>
               </a:rPr>
-              <a:t> (</a:t>
-            </a:r>
-            <a:r>
-              <a:rPr lang="en-US" altLang="zh-TW" dirty="0" err="1" smtClean="0">
+              <a:t> </a:t>
+            </a:r>
+            <a:endParaRPr lang="en-US" altLang="zh-TW" dirty="0" smtClean="0">
+              <a:solidFill>
+                <a:schemeClr val="tx1"/>
+              </a:solidFill>
+            </a:endParaRPr>
+          </a:p>
+          <a:p>
+            <a:pPr marL="0" indent="0">
+              <a:buNone/>
+            </a:pPr>
+            <a:r>
+              <a:rPr lang="en-US" altLang="zh-TW" sz="2000" dirty="0" smtClean="0">
+                <a:solidFill>
+                  <a:schemeClr val="tx1"/>
+                </a:solidFill>
+              </a:rPr>
+              <a:t>[</a:t>
+            </a:r>
+            <a:r>
+              <a:rPr lang="en-US" altLang="zh-TW" sz="2000" dirty="0" err="1" smtClean="0">
                 <a:solidFill>
                   <a:schemeClr val="tx1"/>
                 </a:solidFill>
@@ -25242,13 +25220,34 @@
               <a:t>Bengtson</a:t>
             </a:r>
             <a:r>
-              <a:rPr lang="en-US" altLang="zh-TW" dirty="0" smtClean="0">
+              <a:rPr lang="en-US" altLang="zh-TW" sz="2000" dirty="0" smtClean="0">
                 <a:solidFill>
                   <a:schemeClr val="tx1"/>
                 </a:solidFill>
               </a:rPr>
-              <a:t> and Roth, 2008)</a:t>
-            </a:r>
+              <a:t> </a:t>
+            </a:r>
+            <a:r>
+              <a:rPr lang="en-US" altLang="zh-TW" sz="2000" dirty="0" smtClean="0">
+                <a:solidFill>
+                  <a:schemeClr val="tx1"/>
+                </a:solidFill>
+              </a:rPr>
+              <a:t>and Roth, </a:t>
+            </a:r>
+            <a:r>
+              <a:rPr lang="en-US" altLang="zh-TW" sz="2000" dirty="0" smtClean="0">
+                <a:solidFill>
+                  <a:schemeClr val="tx1"/>
+                </a:solidFill>
+              </a:rPr>
+              <a:t>2008]</a:t>
+            </a:r>
+            <a:endParaRPr lang="en-US" altLang="zh-TW" sz="2000" dirty="0" smtClean="0">
+              <a:solidFill>
+                <a:schemeClr val="tx1"/>
+              </a:solidFill>
+            </a:endParaRPr>
           </a:p>
         </p:txBody>
       </p:sp>
@@ -27095,14 +27094,38 @@
             </a:r>
           </a:p>
           <a:p>
-            <a:r>
-              <a:rPr lang="en-US" altLang="zh-TW" dirty="0" smtClean="0">
+            <a:pPr marL="0" indent="0">
+              <a:buNone/>
+            </a:pPr>
+            <a:r>
+              <a:rPr lang="en-US" altLang="zh-TW" sz="2000" dirty="0" smtClean="0">
                 <a:solidFill>
                   <a:schemeClr val="tx1"/>
                 </a:solidFill>
               </a:rPr>
-              <a:t>McCallum and Wellner, 2003; Finley and Joachims, 2005</a:t>
-            </a:r>
+              <a:t>[McCallum </a:t>
+            </a:r>
+            <a:r>
+              <a:rPr lang="en-US" altLang="zh-TW" sz="2000" dirty="0" smtClean="0">
+                <a:solidFill>
+                  <a:schemeClr val="tx1"/>
+                </a:solidFill>
+              </a:rPr>
+              <a:t>and Wellner, 2003; Finley and Joachims, </a:t>
+            </a:r>
+            <a:r>
+              <a:rPr lang="en-US" altLang="zh-TW" sz="2000" dirty="0" smtClean="0">
+                <a:solidFill>
+                  <a:schemeClr val="tx1"/>
+                </a:solidFill>
+              </a:rPr>
+              <a:t>2005]</a:t>
+            </a:r>
+            <a:endParaRPr lang="en-US" altLang="zh-TW" sz="2000" dirty="0" smtClean="0">
+              <a:solidFill>
+                <a:schemeClr val="tx1"/>
+              </a:solidFill>
+            </a:endParaRPr>
           </a:p>
           <a:p>
             <a:endParaRPr lang="en-US" altLang="zh-TW" dirty="0" smtClean="0">
@@ -30370,11 +30393,7 @@
           <a:p>
             <a:r>
               <a:rPr lang="en-US" altLang="zh-TW" dirty="0" smtClean="0"/>
-              <a:t>Integer Linear Programming (ILP) Formulation for </a:t>
-            </a:r>
-            <a:r>
-              <a:rPr lang="en-US" altLang="zh-TW" dirty="0" smtClean="0"/>
-              <a:t>Co-Reference</a:t>
+              <a:t>Integer Linear Programming (ILP) Formulation for Co-Reference</a:t>
             </a:r>
             <a:endParaRPr lang="zh-TW" altLang="en-US" dirty="0"/>
           </a:p>
@@ -31055,16 +31074,24 @@
           <a:prstGeom prst="rect">
             <a:avLst/>
           </a:prstGeom>
-          <a:solidFill>
-            <a:srgbClr val="FFFFCC"/>
-          </a:solidFill>
-          <a:ln w="12700">
-            <a:solidFill>
-              <a:schemeClr val="tx1"/>
-            </a:solidFill>
+          <a:ln>
+            <a:noFill/>
           </a:ln>
-          <a:effectLst/>
         </p:spPr>
+        <p:style>
+          <a:lnRef idx="2">
+            <a:schemeClr val="dk1"/>
+          </a:lnRef>
+          <a:fillRef idx="1">
+            <a:schemeClr val="lt1"/>
+          </a:fillRef>
+          <a:effectRef idx="0">
+            <a:schemeClr val="dk1"/>
+          </a:effectRef>
+          <a:fontRef idx="minor">
+            <a:schemeClr val="dk1"/>
+          </a:fontRef>
+        </p:style>
         <p:txBody>
           <a:bodyPr wrap="square" rtlCol="0">
             <a:spAutoFit/>
@@ -31075,7 +31102,31 @@
               <a:rPr lang="en-US" dirty="0" smtClean="0">
                 <a:latin typeface="Calibri" panose="020F0502020204030204" pitchFamily="34" charset="0"/>
               </a:rPr>
-              <a:t>See Chang et. al, CoNLL’12 and EMNLP’13 for more general formulation that incorporate background knowledge. </a:t>
+              <a:t>See Chang et. al, CoNLL’12 and EMNLP’13 for </a:t>
+            </a:r>
+            <a:r>
+              <a:rPr lang="en-US" dirty="0" smtClean="0">
+                <a:latin typeface="Calibri" panose="020F0502020204030204" pitchFamily="34" charset="0"/>
+              </a:rPr>
+              <a:t>more a </a:t>
+            </a:r>
+            <a:r>
+              <a:rPr lang="en-US" dirty="0" smtClean="0">
+                <a:latin typeface="Calibri" panose="020F0502020204030204" pitchFamily="34" charset="0"/>
+              </a:rPr>
+              <a:t>general formulation that </a:t>
+            </a:r>
+            <a:r>
+              <a:rPr lang="en-US" dirty="0" smtClean="0">
+                <a:latin typeface="Calibri" panose="020F0502020204030204" pitchFamily="34" charset="0"/>
+              </a:rPr>
+              <a:t>incorporates </a:t>
+            </a:r>
+            <a:r>
+              <a:rPr lang="en-US" dirty="0" smtClean="0">
+                <a:latin typeface="Calibri" panose="020F0502020204030204" pitchFamily="34" charset="0"/>
+              </a:rPr>
+              <a:t>background knowledge. </a:t>
             </a:r>
             <a:endParaRPr lang="en-US" dirty="0">
               <a:latin typeface="Calibri" panose="020F0502020204030204" pitchFamily="34" charset="0"/>
@@ -31455,51 +31506,6 @@
                       </p:childTnLst>
                     </p:cTn>
                   </p:par>
-                  <p:par>
-                    <p:cTn id="33" fill="hold">
-                      <p:stCondLst>
-                        <p:cond delay="indefinite"/>
-                      </p:stCondLst>
-                      <p:childTnLst>
-                        <p:par>
-                          <p:cTn id="34" fill="hold">
-                            <p:stCondLst>
-                              <p:cond delay="0"/>
-                            </p:stCondLst>
-                            <p:childTnLst>
-                              <p:par>
-                                <p:cTn id="35" presetID="1" presetClass="entr" presetSubtype="0" fill="hold" grpId="0" nodeType="clickEffect">
-                                  <p:stCondLst>
-                                    <p:cond delay="0"/>
-                                  </p:stCondLst>
-                                  <p:childTnLst>
-                                    <p:set>
-                                      <p:cBhvr>
-                                        <p:cTn id="36" dur="1" fill="hold">
-                                          <p:stCondLst>
-                                            <p:cond delay="0"/>
-                                          </p:stCondLst>
-                                        </p:cTn>
-                                        <p:tgtEl>
-                                          <p:spTgt spid="5"/>
-                                        </p:tgtEl>
-                                        <p:attrNameLst>
-                                          <p:attrName>style.visibility</p:attrName>
-                                        </p:attrNameLst>
-                                      </p:cBhvr>
-                                      <p:to>
-                                        <p:strVal val="visible"/>
-                                      </p:to>
-                                    </p:set>
-                                  </p:childTnLst>
-                                </p:cTn>
-                              </p:par>
-                            </p:childTnLst>
-                          </p:cTn>
-                        </p:par>
-                      </p:childTnLst>
-                    </p:cTn>
-                  </p:par>
                 </p:childTnLst>
               </p:cTn>
               <p:prevCondLst>
@@ -31527,7 +31533,6 @@
       <p:bldP spid="15" grpId="1" animBg="1"/>
       <p:bldP spid="18" grpId="0" animBg="1"/>
       <p:bldP spid="19" grpId="0" animBg="1"/>
-      <p:bldP spid="5" grpId="0" animBg="1"/>
     </p:bldLst>
   </p:timing>
 </p:sld>

</xml_diff>